<commit_message>
Added datasheet for L298N and TFG information + First notes about PWM control
</commit_message>
<xml_diff>
--- a/Presentacions/Resultats de l’Anàlisi de la Planta de DS - Compendi.pptx
+++ b/Presentacions/Resultats de l’Anàlisi de la Planta de DS - Compendi.pptx
@@ -3507,6 +3507,58 @@
           <a:bodyPr/>
           <a:lstStyle/>
           <a:p>
+            <a:r>
+              <a:rPr lang="ca-ES" dirty="0" smtClean="0"/>
+              <a:t>Placa</a:t>
+            </a:r>
+            <a:r>
+              <a:rPr lang="ca-ES" baseline="0" dirty="0" smtClean="0"/>
+              <a:t> de PWM externa – </a:t>
+            </a:r>
+            <a:r>
+              <a:rPr lang="ca-ES" baseline="0" dirty="0" err="1" smtClean="0"/>
+              <a:t>Solucio</a:t>
+            </a:r>
+            <a:r>
+              <a:rPr lang="ca-ES" baseline="0" dirty="0" smtClean="0"/>
+              <a:t> objectiu</a:t>
+            </a:r>
+          </a:p>
+          <a:p>
+            <a:r>
+              <a:rPr lang="ca-ES" baseline="0" dirty="0" smtClean="0"/>
+              <a:t>Canviar transistors – El  circuit és per a règim </a:t>
+            </a:r>
+            <a:r>
+              <a:rPr lang="ca-ES" baseline="0" dirty="0" err="1" smtClean="0"/>
+              <a:t>anàlogic</a:t>
+            </a:r>
+            <a:r>
+              <a:rPr lang="ca-ES" baseline="0" dirty="0" smtClean="0"/>
+              <a:t>, no val la pena reciclar</a:t>
+            </a:r>
+          </a:p>
+          <a:p>
+            <a:r>
+              <a:rPr lang="ca-ES" baseline="0" dirty="0" err="1" smtClean="0"/>
+              <a:t>Histerèsi</a:t>
+            </a:r>
+            <a:r>
+              <a:rPr lang="ca-ES" baseline="0" dirty="0" smtClean="0"/>
+              <a:t>, </a:t>
+            </a:r>
+            <a:r>
+              <a:rPr lang="ca-ES" baseline="0" dirty="0" err="1" smtClean="0"/>
+              <a:t>etc</a:t>
+            </a:r>
+            <a:r>
+              <a:rPr lang="ca-ES" baseline="0" dirty="0" smtClean="0"/>
+              <a:t> – No val la pena, si es fa per software no seria adequat per a DS i si fos </a:t>
+            </a:r>
+            <a:r>
+              <a:rPr lang="ca-ES" baseline="0" smtClean="0"/>
+              <a:t>en hardware millor fer la placa de PWM</a:t>
+            </a:r>
             <a:endParaRPr lang="ca-ES" dirty="0"/>
           </a:p>
         </p:txBody>
@@ -19850,9 +19902,10 @@
               <a:t>etc</a:t>
             </a:r>
             <a:r>
-              <a:rPr lang="ca-ES" dirty="0"/>
+              <a:rPr lang="ca-ES" dirty="0" smtClean="0"/>
               <a:t>)</a:t>
             </a:r>
+            <a:endParaRPr lang="ca-ES" dirty="0"/>
           </a:p>
         </p:txBody>
       </p:sp>
@@ -22788,15 +22841,6 @@
 </file>
 
 <file path=customXml/item1.xml><?xml version="1.0" encoding="utf-8"?>
-<?mso-contentType ?>
-<FormTemplates xmlns="http://schemas.microsoft.com/sharepoint/v3/contenttype/forms">
-  <Display>DocumentLibraryForm</Display>
-  <Edit>DocumentLibraryForm</Edit>
-  <New>DocumentLibraryForm</New>
-</FormTemplates>
-</file>
-
-<file path=customXml/item2.xml><?xml version="1.0" encoding="utf-8"?>
 <ct:contentTypeSchema xmlns:ct="http://schemas.microsoft.com/office/2006/metadata/contentType" xmlns:ma="http://schemas.microsoft.com/office/2006/metadata/properties/metaAttributes" ct:_="" ma:_="" ma:contentTypeName="Document" ma:contentTypeID="0x010100DEEA25CC0A0AC24199CDC46C25B8B0BC" ma:contentTypeVersion="10" ma:contentTypeDescription="Create a new document." ma:contentTypeScope="" ma:versionID="e3b47856d4cf355c0dacb39e1084d14f">
   <xsd:schema xmlns:xsd="http://www.w3.org/2001/XMLSchema" xmlns:xs="http://www.w3.org/2001/XMLSchema" xmlns:p="http://schemas.microsoft.com/office/2006/metadata/properties" xmlns:ns1="http://schemas.microsoft.com/sharepoint/v3" xmlns:ns2="6dc4bcd6-49db-4c07-9060-8acfc67cef9f" xmlns:ns3="fb0879af-3eba-417a-a55a-ffe6dcd6ca77" targetNamespace="http://schemas.microsoft.com/office/2006/metadata/properties" ma:root="true" ma:fieldsID="a845a615265fdb1f7b12cc65ac20ecbd" ns1:_="" ns2:_="" ns3:_="">
     <xsd:import namespace="http://schemas.microsoft.com/sharepoint/v3"/>
@@ -23004,7 +23048,7 @@
 </ct:contentTypeSchema>
 </file>
 
-<file path=customXml/item3.xml><?xml version="1.0" encoding="utf-8"?>
+<file path=customXml/item2.xml><?xml version="1.0" encoding="utf-8"?>
 <p:properties xmlns:p="http://schemas.microsoft.com/office/2006/metadata/properties" xmlns:xsi="http://www.w3.org/2001/XMLSchema-instance" xmlns:pc="http://schemas.microsoft.com/office/infopath/2007/PartnerControls">
   <documentManagement>
     <_ip_UnifiedCompliancePolicyUIAction xmlns="http://schemas.microsoft.com/sharepoint/v3" xsi:nil="true"/>
@@ -23013,15 +23057,16 @@
 </p:properties>
 </file>
 
-<file path=customXml/itemProps1.xml><?xml version="1.0" encoding="utf-8"?>
-<ds:datastoreItem xmlns:ds="http://schemas.openxmlformats.org/officeDocument/2006/customXml" ds:itemID="{F6CB1848-D3E0-4F10-B640-720BE758B85B}">
-  <ds:schemaRefs>
-    <ds:schemaRef ds:uri="http://schemas.microsoft.com/sharepoint/v3/contenttype/forms"/>
-  </ds:schemaRefs>
-</ds:datastoreItem>
+<file path=customXml/item3.xml><?xml version="1.0" encoding="utf-8"?>
+<?mso-contentType ?>
+<FormTemplates xmlns="http://schemas.microsoft.com/sharepoint/v3/contenttype/forms">
+  <Display>DocumentLibraryForm</Display>
+  <Edit>DocumentLibraryForm</Edit>
+  <New>DocumentLibraryForm</New>
+</FormTemplates>
 </file>
 
-<file path=customXml/itemProps2.xml><?xml version="1.0" encoding="utf-8"?>
+<file path=customXml/itemProps1.xml><?xml version="1.0" encoding="utf-8"?>
 <ds:datastoreItem xmlns:ds="http://schemas.openxmlformats.org/officeDocument/2006/customXml" ds:itemID="{1BBB5711-29E1-4F8E-81A0-7947C57B208A}">
   <ds:schemaRefs>
     <ds:schemaRef ds:uri="http://schemas.microsoft.com/office/2006/metadata/contentType"/>
@@ -23041,7 +23086,7 @@
 </ds:datastoreItem>
 </file>
 
-<file path=customXml/itemProps3.xml><?xml version="1.0" encoding="utf-8"?>
+<file path=customXml/itemProps2.xml><?xml version="1.0" encoding="utf-8"?>
 <ds:datastoreItem xmlns:ds="http://schemas.openxmlformats.org/officeDocument/2006/customXml" ds:itemID="{E4934E25-8442-49E9-ABDF-3146C4145F3B}">
   <ds:schemaRefs>
     <ds:schemaRef ds:uri="http://schemas.microsoft.com/office/infopath/2007/PartnerControls"/>
@@ -23057,4 +23102,12 @@
     <ds:schemaRef ds:uri="http://purl.org/dc/dcmitype/"/>
   </ds:schemaRefs>
 </ds:datastoreItem>
+</file>
+
+<file path=customXml/itemProps3.xml><?xml version="1.0" encoding="utf-8"?>
+<ds:datastoreItem xmlns:ds="http://schemas.openxmlformats.org/officeDocument/2006/customXml" ds:itemID="{F6CB1848-D3E0-4F10-B640-720BE758B85B}">
+  <ds:schemaRefs>
+    <ds:schemaRef ds:uri="http://schemas.microsoft.com/sharepoint/v3/contenttype/forms"/>
+  </ds:schemaRefs>
+</ds:datastoreItem>
 </file>
</xml_diff>